<commit_message>
Update All NuGets for the blog, edit/proofread project documents, edit/proofread DataDriven xlsx
</commit_message>
<xml_diff>
--- a/Documentation/SoftUni-QA_Automation-BlogProject-Feijoa-Features.pptx
+++ b/Documentation/SoftUni-QA_Automation-BlogProject-Feijoa-Features.pptx
@@ -125,7 +125,7 @@
   </p:defaultTextStyle>
   <p:extLst>
     <p:ext uri="{EFAFB233-063F-42B5-8137-9DF3F51BA10A}">
-      <p15:sldGuideLst xmlns="" xmlns:p15="http://schemas.microsoft.com/office/powerpoint/2012/main">
+      <p15:sldGuideLst xmlns:p15="http://schemas.microsoft.com/office/powerpoint/2012/main" xmlns="">
         <p15:guide id="1" orient="horz" pos="2160" userDrawn="1">
           <p15:clr>
             <a:srgbClr val="A4A3A4"/>
@@ -139,7 +139,7 @@
       </p15:sldGuideLst>
     </p:ext>
     <p:ext uri="{2D200454-40CA-4A62-9FC3-DE9A4176ACB9}">
-      <p15:notesGuideLst xmlns="" xmlns:p15="http://schemas.microsoft.com/office/powerpoint/2012/main">
+      <p15:notesGuideLst xmlns:p15="http://schemas.microsoft.com/office/powerpoint/2012/main" xmlns="">
         <p15:guide id="1" orient="horz" pos="2880">
           <p15:clr>
             <a:srgbClr val="A4A3A4"/>
@@ -239,7 +239,7 @@
             <a:fld id="{FE5B4EDC-59C0-49C7-8ADA-5A781B329E02}" type="datetimeFigureOut">
               <a:rPr lang="en-US"/>
               <a:pPr/>
-              <a:t>01-Jun-17</a:t>
+              <a:t>02-Jun-17</a:t>
             </a:fld>
             <a:endParaRPr dirty="0"/>
           </a:p>
@@ -438,7 +438,7 @@
             <a:fld id="{F2D8D46A-B586-417D-BFBD-8C8FE0AAF762}" type="datetimeFigureOut">
               <a:rPr lang="en-US" smtClean="0"/>
               <a:pPr/>
-              <a:t>01-Jun-17</a:t>
+              <a:t>02-Jun-17</a:t>
             </a:fld>
             <a:endParaRPr lang="en-US"/>
           </a:p>
@@ -2642,7 +2642,7 @@
             <a:lum/>
             <a:extLst>
               <a:ext uri="{28A0092B-C50C-407E-A947-70E740481C1C}">
-                <a14:useLocalDpi xmlns:a14="http://schemas.microsoft.com/office/drawing/2010/main" val="0"/>
+                <a14:useLocalDpi xmlns:a14="http://schemas.microsoft.com/office/drawing/2010/main"/>
               </a:ext>
             </a:extLst>
           </a:blip>
@@ -3180,7 +3180,7 @@
             <a:lum/>
             <a:extLst>
               <a:ext uri="{28A0092B-C50C-407E-A947-70E740481C1C}">
-                <a14:useLocalDpi xmlns:a14="http://schemas.microsoft.com/office/drawing/2010/main" val="0"/>
+                <a14:useLocalDpi xmlns:a14="http://schemas.microsoft.com/office/drawing/2010/main"/>
               </a:ext>
             </a:extLst>
           </a:blip>
@@ -3242,7 +3242,7 @@
             <a:fld id="{055373AC-9AA7-423B-BA00-BA1C74164DBD}" type="datetime1">
               <a:rPr lang="en-US" smtClean="0"/>
               <a:pPr/>
-              <a:t>01-Jun-17</a:t>
+              <a:t>02-Jun-17</a:t>
             </a:fld>
             <a:endParaRPr lang="en-US" dirty="0"/>
           </a:p>
@@ -3461,7 +3461,7 @@
           <a:blip r:embed="rId3" cstate="print">
             <a:extLst>
               <a:ext uri="{28A0092B-C50C-407E-A947-70E740481C1C}">
-                <a14:useLocalDpi xmlns:a14="http://schemas.microsoft.com/office/drawing/2010/main" val="0"/>
+                <a14:useLocalDpi xmlns:a14="http://schemas.microsoft.com/office/drawing/2010/main"/>
               </a:ext>
             </a:extLst>
           </a:blip>
@@ -3519,7 +3519,7 @@
             <a:lum/>
             <a:extLst>
               <a:ext uri="{28A0092B-C50C-407E-A947-70E740481C1C}">
-                <a14:useLocalDpi xmlns:a14="http://schemas.microsoft.com/office/drawing/2010/main" val="0"/>
+                <a14:useLocalDpi xmlns:a14="http://schemas.microsoft.com/office/drawing/2010/main"/>
               </a:ext>
             </a:extLst>
           </a:blip>
@@ -3713,7 +3713,7 @@
           <a:blip r:embed="rId3" cstate="print">
             <a:extLst>
               <a:ext uri="{28A0092B-C50C-407E-A947-70E740481C1C}">
-                <a14:useLocalDpi xmlns:a14="http://schemas.microsoft.com/office/drawing/2010/main" val="0"/>
+                <a14:useLocalDpi xmlns:a14="http://schemas.microsoft.com/office/drawing/2010/main"/>
               </a:ext>
             </a:extLst>
           </a:blip>
@@ -3771,7 +3771,7 @@
             <a:lum/>
             <a:extLst>
               <a:ext uri="{28A0092B-C50C-407E-A947-70E740481C1C}">
-                <a14:useLocalDpi xmlns:a14="http://schemas.microsoft.com/office/drawing/2010/main" val="0"/>
+                <a14:useLocalDpi xmlns:a14="http://schemas.microsoft.com/office/drawing/2010/main"/>
               </a:ext>
             </a:extLst>
           </a:blip>
@@ -3835,7 +3835,7 @@
             <a:lum/>
             <a:extLst>
               <a:ext uri="{28A0092B-C50C-407E-A947-70E740481C1C}">
-                <a14:useLocalDpi xmlns:a14="http://schemas.microsoft.com/office/drawing/2010/main" val="0"/>
+                <a14:useLocalDpi xmlns:a14="http://schemas.microsoft.com/office/drawing/2010/main"/>
               </a:ext>
             </a:extLst>
           </a:blip>
@@ -3998,7 +3998,7 @@
           <a:blip r:embed="rId3" cstate="print">
             <a:extLst>
               <a:ext uri="{28A0092B-C50C-407E-A947-70E740481C1C}">
-                <a14:useLocalDpi xmlns:a14="http://schemas.microsoft.com/office/drawing/2010/main" val="0"/>
+                <a14:useLocalDpi xmlns:a14="http://schemas.microsoft.com/office/drawing/2010/main"/>
               </a:ext>
             </a:extLst>
           </a:blip>
@@ -4451,7 +4451,7 @@
             <a:lum/>
             <a:extLst>
               <a:ext uri="{28A0092B-C50C-407E-A947-70E740481C1C}">
-                <a14:useLocalDpi xmlns:a14="http://schemas.microsoft.com/office/drawing/2010/main" val="0"/>
+                <a14:useLocalDpi xmlns:a14="http://schemas.microsoft.com/office/drawing/2010/main"/>
               </a:ext>
             </a:extLst>
           </a:blip>
@@ -4513,7 +4513,7 @@
             <a:fld id="{055373AC-9AA7-423B-BA00-BA1C74164DBD}" type="datetime1">
               <a:rPr lang="en-US" smtClean="0"/>
               <a:pPr/>
-              <a:t>01-Jun-17</a:t>
+              <a:t>02-Jun-17</a:t>
             </a:fld>
             <a:endParaRPr lang="en-US" dirty="0"/>
           </a:p>
@@ -5057,7 +5057,7 @@
   </p:txStyles>
   <p:extLst mod="1">
     <p:ext uri="{27BBF7A9-308A-43DC-89C8-2F10F3537804}">
-      <p15:sldGuideLst xmlns="" xmlns:p15="http://schemas.microsoft.com/office/powerpoint/2012/main">
+      <p15:sldGuideLst xmlns:p15="http://schemas.microsoft.com/office/powerpoint/2012/main" xmlns="">
         <p15:guide id="1" orient="horz" pos="2160" userDrawn="1">
           <p15:clr>
             <a:srgbClr val="F26B43"/>
@@ -5329,7 +5329,7 @@
           <a:blip r:embed="rId6">
             <a:extLst>
               <a:ext uri="{28A0092B-C50C-407E-A947-70E740481C1C}">
-                <a14:useLocalDpi xmlns:a14="http://schemas.microsoft.com/office/drawing/2010/main" val="0"/>
+                <a14:useLocalDpi xmlns:a14="http://schemas.microsoft.com/office/drawing/2010/main"/>
               </a:ext>
             </a:extLst>
           </a:blip>
@@ -5378,7 +5378,7 @@
           <a:blip r:embed="rId7" cstate="print">
             <a:extLst>
               <a:ext uri="{28A0092B-C50C-407E-A947-70E740481C1C}">
-                <a14:useLocalDpi xmlns:a14="http://schemas.microsoft.com/office/drawing/2010/main" val="0"/>
+                <a14:useLocalDpi xmlns:a14="http://schemas.microsoft.com/office/drawing/2010/main"/>
               </a:ext>
             </a:extLst>
           </a:blip>
@@ -5406,7 +5406,7 @@
           <a:blip r:embed="rId8">
             <a:extLst>
               <a:ext uri="{28A0092B-C50C-407E-A947-70E740481C1C}">
-                <a14:useLocalDpi xmlns:a14="http://schemas.microsoft.com/office/drawing/2010/main" val="0"/>
+                <a14:useLocalDpi xmlns:a14="http://schemas.microsoft.com/office/drawing/2010/main"/>
               </a:ext>
             </a:extLst>
           </a:blip>
@@ -5556,7 +5556,7 @@
           <a:blip r:embed="rId10" cstate="print">
             <a:extLst>
               <a:ext uri="{28A0092B-C50C-407E-A947-70E740481C1C}">
-                <a14:useLocalDpi xmlns:a14="http://schemas.microsoft.com/office/drawing/2010/main" val="0"/>
+                <a14:useLocalDpi xmlns:a14="http://schemas.microsoft.com/office/drawing/2010/main"/>
               </a:ext>
             </a:extLst>
           </a:blip>
@@ -6168,7 +6168,7 @@
           <a:blip r:embed="rId4">
             <a:extLst>
               <a:ext uri="{28A0092B-C50C-407E-A947-70E740481C1C}">
-                <a14:useLocalDpi xmlns:a14="http://schemas.microsoft.com/office/drawing/2010/main" val="0"/>
+                <a14:useLocalDpi xmlns:a14="http://schemas.microsoft.com/office/drawing/2010/main"/>
               </a:ext>
             </a:extLst>
           </a:blip>
@@ -6209,7 +6209,7 @@
           <a:blip r:embed="rId5" cstate="print">
             <a:extLst>
               <a:ext uri="{28A0092B-C50C-407E-A947-70E740481C1C}">
-                <a14:useLocalDpi xmlns:a14="http://schemas.microsoft.com/office/drawing/2010/main" val="0"/>
+                <a14:useLocalDpi xmlns:a14="http://schemas.microsoft.com/office/drawing/2010/main"/>
               </a:ext>
             </a:extLst>
           </a:blip>
@@ -6376,7 +6376,7 @@
           <a:blip r:embed="rId3">
             <a:extLst>
               <a:ext uri="{28A0092B-C50C-407E-A947-70E740481C1C}">
-                <a14:useLocalDpi xmlns:a14="http://schemas.microsoft.com/office/drawing/2010/main" val="0"/>
+                <a14:useLocalDpi xmlns:a14="http://schemas.microsoft.com/office/drawing/2010/main"/>
               </a:ext>
             </a:extLst>
           </a:blip>
@@ -6705,7 +6705,7 @@
           <a:blip r:embed="rId4">
             <a:extLst>
               <a:ext uri="{28A0092B-C50C-407E-A947-70E740481C1C}">
-                <a14:useLocalDpi xmlns:a14="http://schemas.microsoft.com/office/drawing/2010/main" val="0"/>
+                <a14:useLocalDpi xmlns:a14="http://schemas.microsoft.com/office/drawing/2010/main"/>
               </a:ext>
             </a:extLst>
           </a:blip>
@@ -7112,7 +7112,7 @@
           <a:blip r:embed="rId8" cstate="print">
             <a:extLst>
               <a:ext uri="{28A0092B-C50C-407E-A947-70E740481C1C}">
-                <a14:useLocalDpi xmlns:a14="http://schemas.microsoft.com/office/drawing/2010/main" val="0"/>
+                <a14:useLocalDpi xmlns:a14="http://schemas.microsoft.com/office/drawing/2010/main"/>
               </a:ext>
             </a:extLst>
           </a:blip>
@@ -7151,7 +7151,7 @@
           <a:blip r:embed="rId9" cstate="print">
             <a:extLst>
               <a:ext uri="{28A0092B-C50C-407E-A947-70E740481C1C}">
-                <a14:useLocalDpi xmlns:a14="http://schemas.microsoft.com/office/drawing/2010/main" val="0"/>
+                <a14:useLocalDpi xmlns:a14="http://schemas.microsoft.com/office/drawing/2010/main"/>
               </a:ext>
             </a:extLst>
           </a:blip>
@@ -7197,7 +7197,7 @@
           <a:blip r:embed="rId11" cstate="print">
             <a:extLst>
               <a:ext uri="{28A0092B-C50C-407E-A947-70E740481C1C}">
-                <a14:useLocalDpi xmlns:a14="http://schemas.microsoft.com/office/drawing/2010/main" val="0"/>
+                <a14:useLocalDpi xmlns:a14="http://schemas.microsoft.com/office/drawing/2010/main"/>
               </a:ext>
             </a:extLst>
           </a:blip>
@@ -7238,7 +7238,7 @@
           <a:blip r:embed="rId12">
             <a:extLst>
               <a:ext uri="{28A0092B-C50C-407E-A947-70E740481C1C}">
-                <a14:useLocalDpi xmlns:a14="http://schemas.microsoft.com/office/drawing/2010/main" val="0"/>
+                <a14:useLocalDpi xmlns:a14="http://schemas.microsoft.com/office/drawing/2010/main"/>
               </a:ext>
             </a:extLst>
           </a:blip>
@@ -7289,7 +7289,7 @@
           <a:blip r:embed="rId13" cstate="print">
             <a:extLst>
               <a:ext uri="{28A0092B-C50C-407E-A947-70E740481C1C}">
-                <a14:useLocalDpi xmlns:a14="http://schemas.microsoft.com/office/drawing/2010/main" val="0"/>
+                <a14:useLocalDpi xmlns:a14="http://schemas.microsoft.com/office/drawing/2010/main"/>
               </a:ext>
             </a:extLst>
           </a:blip>
@@ -7364,7 +7364,7 @@
           <a:blip r:embed="rId3">
             <a:extLst>
               <a:ext uri="{28A0092B-C50C-407E-A947-70E740481C1C}">
-                <a14:useLocalDpi xmlns:a14="http://schemas.microsoft.com/office/drawing/2010/main" val="0"/>
+                <a14:useLocalDpi xmlns:a14="http://schemas.microsoft.com/office/drawing/2010/main"/>
               </a:ext>
             </a:extLst>
           </a:blip>
@@ -7776,7 +7776,7 @@
           <a:blip r:embed="rId3" cstate="screen">
             <a:extLst>
               <a:ext uri="{28A0092B-C50C-407E-A947-70E740481C1C}">
-                <a14:useLocalDpi xmlns:a14="http://schemas.microsoft.com/office/drawing/2010/main" val="0"/>
+                <a14:useLocalDpi xmlns:a14="http://schemas.microsoft.com/office/drawing/2010/main"/>
               </a:ext>
             </a:extLst>
           </a:blip>
@@ -7879,7 +7879,7 @@
           <a:blip r:embed="rId4" cstate="print">
             <a:extLst>
               <a:ext uri="{28A0092B-C50C-407E-A947-70E740481C1C}">
-                <a14:useLocalDpi xmlns:a14="http://schemas.microsoft.com/office/drawing/2010/main" val="0"/>
+                <a14:useLocalDpi xmlns:a14="http://schemas.microsoft.com/office/drawing/2010/main"/>
               </a:ext>
             </a:extLst>
           </a:blip>
@@ -7960,7 +7960,7 @@
           <a:blip r:embed="rId5">
             <a:extLst>
               <a:ext uri="{28A0092B-C50C-407E-A947-70E740481C1C}">
-                <a14:useLocalDpi xmlns:a14="http://schemas.microsoft.com/office/drawing/2010/main" val="0"/>
+                <a14:useLocalDpi xmlns:a14="http://schemas.microsoft.com/office/drawing/2010/main"/>
               </a:ext>
             </a:extLst>
           </a:blip>
@@ -8900,7 +8900,7 @@
           <a:blip r:embed="rId3">
             <a:extLst>
               <a:ext uri="{28A0092B-C50C-407E-A947-70E740481C1C}">
-                <a14:useLocalDpi xmlns:a14="http://schemas.microsoft.com/office/drawing/2010/main" val="0"/>
+                <a14:useLocalDpi xmlns:a14="http://schemas.microsoft.com/office/drawing/2010/main"/>
               </a:ext>
             </a:extLst>
           </a:blip>
@@ -9206,7 +9206,7 @@
           <a:blip r:embed="rId3" cstate="print">
             <a:extLst>
               <a:ext uri="{28A0092B-C50C-407E-A947-70E740481C1C}">
-                <a14:useLocalDpi xmlns:a14="http://schemas.microsoft.com/office/drawing/2010/main" val="0"/>
+                <a14:useLocalDpi xmlns:a14="http://schemas.microsoft.com/office/drawing/2010/main"/>
               </a:ext>
             </a:extLst>
           </a:blip>
@@ -9290,7 +9290,7 @@
           <a:blip r:embed="rId3">
             <a:extLst>
               <a:ext uri="{28A0092B-C50C-407E-A947-70E740481C1C}">
-                <a14:useLocalDpi xmlns:a14="http://schemas.microsoft.com/office/drawing/2010/main" val="0"/>
+                <a14:useLocalDpi xmlns:a14="http://schemas.microsoft.com/office/drawing/2010/main"/>
               </a:ext>
             </a:extLst>
           </a:blip>
@@ -10025,7 +10025,7 @@
           <a:blip r:embed="rId3">
             <a:extLst>
               <a:ext uri="{28A0092B-C50C-407E-A947-70E740481C1C}">
-                <a14:useLocalDpi xmlns:a14="http://schemas.microsoft.com/office/drawing/2010/main" val="0"/>
+                <a14:useLocalDpi xmlns:a14="http://schemas.microsoft.com/office/drawing/2010/main"/>
               </a:ext>
             </a:extLst>
           </a:blip>
@@ -10066,7 +10066,7 @@
           <a:blip r:embed="rId4" cstate="print">
             <a:extLst>
               <a:ext uri="{28A0092B-C50C-407E-A947-70E740481C1C}">
-                <a14:useLocalDpi xmlns:a14="http://schemas.microsoft.com/office/drawing/2010/main" val="0"/>
+                <a14:useLocalDpi xmlns:a14="http://schemas.microsoft.com/office/drawing/2010/main"/>
               </a:ext>
             </a:extLst>
           </a:blip>
@@ -10152,7 +10152,7 @@
           <a:blip r:embed="rId3" cstate="print">
             <a:extLst>
               <a:ext uri="{28A0092B-C50C-407E-A947-70E740481C1C}">
-                <a14:useLocalDpi xmlns:a14="http://schemas.microsoft.com/office/drawing/2010/main" val="0"/>
+                <a14:useLocalDpi xmlns:a14="http://schemas.microsoft.com/office/drawing/2010/main"/>
               </a:ext>
             </a:extLst>
           </a:blip>
@@ -10373,7 +10373,7 @@
           <a:blip r:embed="rId4" cstate="print">
             <a:extLst>
               <a:ext uri="{28A0092B-C50C-407E-A947-70E740481C1C}">
-                <a14:useLocalDpi xmlns:a14="http://schemas.microsoft.com/office/drawing/2010/main" val="0"/>
+                <a14:useLocalDpi xmlns:a14="http://schemas.microsoft.com/office/drawing/2010/main"/>
               </a:ext>
             </a:extLst>
           </a:blip>

</xml_diff>

<commit_message>
Create Register negative tests using Gherkin and SpecFlow closes #31
</commit_message>
<xml_diff>
--- a/Documentation/SoftUni-QA_Automation-BlogProject-Feijoa-Features.pptx
+++ b/Documentation/SoftUni-QA_Automation-BlogProject-Feijoa-Features.pptx
@@ -125,7 +125,7 @@
   </p:defaultTextStyle>
   <p:extLst>
     <p:ext uri="{EFAFB233-063F-42B5-8137-9DF3F51BA10A}">
-      <p15:sldGuideLst xmlns:p15="http://schemas.microsoft.com/office/powerpoint/2012/main" xmlns="">
+      <p15:sldGuideLst xmlns="" xmlns:p15="http://schemas.microsoft.com/office/powerpoint/2012/main">
         <p15:guide id="1" orient="horz" pos="2160" userDrawn="1">
           <p15:clr>
             <a:srgbClr val="A4A3A4"/>
@@ -139,7 +139,7 @@
       </p15:sldGuideLst>
     </p:ext>
     <p:ext uri="{2D200454-40CA-4A62-9FC3-DE9A4176ACB9}">
-      <p15:notesGuideLst xmlns:p15="http://schemas.microsoft.com/office/powerpoint/2012/main" xmlns="">
+      <p15:notesGuideLst xmlns="" xmlns:p15="http://schemas.microsoft.com/office/powerpoint/2012/main">
         <p15:guide id="1" orient="horz" pos="2880">
           <p15:clr>
             <a:srgbClr val="A4A3A4"/>
@@ -239,7 +239,7 @@
             <a:fld id="{FE5B4EDC-59C0-49C7-8ADA-5A781B329E02}" type="datetimeFigureOut">
               <a:rPr lang="en-US"/>
               <a:pPr/>
-              <a:t>02-Jun-17</a:t>
+              <a:t>07-Jun-17</a:t>
             </a:fld>
             <a:endParaRPr dirty="0"/>
           </a:p>
@@ -438,7 +438,7 @@
             <a:fld id="{F2D8D46A-B586-417D-BFBD-8C8FE0AAF762}" type="datetimeFigureOut">
               <a:rPr lang="en-US" smtClean="0"/>
               <a:pPr/>
-              <a:t>02-Jun-17</a:t>
+              <a:t>07-Jun-17</a:t>
             </a:fld>
             <a:endParaRPr lang="en-US"/>
           </a:p>
@@ -3242,7 +3242,7 @@
             <a:fld id="{055373AC-9AA7-423B-BA00-BA1C74164DBD}" type="datetime1">
               <a:rPr lang="en-US" smtClean="0"/>
               <a:pPr/>
-              <a:t>02-Jun-17</a:t>
+              <a:t>07-Jun-17</a:t>
             </a:fld>
             <a:endParaRPr lang="en-US" dirty="0"/>
           </a:p>
@@ -4513,7 +4513,7 @@
             <a:fld id="{055373AC-9AA7-423B-BA00-BA1C74164DBD}" type="datetime1">
               <a:rPr lang="en-US" smtClean="0"/>
               <a:pPr/>
-              <a:t>02-Jun-17</a:t>
+              <a:t>07-Jun-17</a:t>
             </a:fld>
             <a:endParaRPr lang="en-US" dirty="0"/>
           </a:p>
@@ -5057,7 +5057,7 @@
   </p:txStyles>
   <p:extLst mod="1">
     <p:ext uri="{27BBF7A9-308A-43DC-89C8-2F10F3537804}">
-      <p15:sldGuideLst xmlns:p15="http://schemas.microsoft.com/office/powerpoint/2012/main" xmlns="">
+      <p15:sldGuideLst xmlns="" xmlns:p15="http://schemas.microsoft.com/office/powerpoint/2012/main">
         <p15:guide id="1" orient="horz" pos="2160" userDrawn="1">
           <p15:clr>
             <a:srgbClr val="F26B43"/>
@@ -5835,7 +5835,11 @@
             </a:r>
             <a:r>
               <a:rPr lang="en-US" b="0" dirty="0" smtClean="0"/>
-              <a:t> 2</a:t>
+              <a:t> </a:t>
+            </a:r>
+            <a:r>
+              <a:rPr lang="en-US" b="0" dirty="0" smtClean="0"/>
+              <a:t>2.2</a:t>
             </a:r>
             <a:endParaRPr lang="en-US" b="0" dirty="0"/>
           </a:p>
@@ -9008,8 +9012,8 @@
         </p:nvSpPr>
         <p:spPr>
           <a:xfrm>
-            <a:off x="190413" y="1053001"/>
-            <a:ext cx="11804822" cy="5668476"/>
+            <a:off x="190412" y="1053001"/>
+            <a:ext cx="11923799" cy="5668476"/>
           </a:xfrm>
         </p:spPr>
         <p:txBody>
@@ -9078,7 +9082,76 @@
             </a:br>
             <a:r>
               <a:rPr lang="en-US" dirty="0" smtClean="0"/>
-              <a:t>counterpart</a:t>
+              <a:t>counterpart;</a:t>
+            </a:r>
+          </a:p>
+          <a:p>
+            <a:pPr lvl="1">
+              <a:lnSpc>
+                <a:spcPct val="100000"/>
+              </a:lnSpc>
+            </a:pPr>
+            <a:r>
+              <a:rPr lang="en-US" dirty="0" smtClean="0"/>
+              <a:t>also exact properties to run a test suite (e.g.: </a:t>
+            </a:r>
+            <a:r>
+              <a:rPr lang="en-US" dirty="0">
+                <a:solidFill>
+                  <a:schemeClr val="tx2">
+                    <a:lumMod val="75000"/>
+                  </a:schemeClr>
+                </a:solidFill>
+              </a:rPr>
+              <a:t>@</a:t>
+            </a:r>
+            <a:r>
+              <a:rPr lang="en-US" dirty="0" smtClean="0">
+                <a:solidFill>
+                  <a:schemeClr val="tx2">
+                    <a:lumMod val="75000"/>
+                  </a:schemeClr>
+                </a:solidFill>
+              </a:rPr>
+              <a:t>Regression (Gherkin) </a:t>
+            </a:r>
+            <a:r>
+              <a:rPr lang="en-US" dirty="0" smtClean="0"/>
+              <a:t>vs</a:t>
+            </a:r>
+            <a:r>
+              <a:rPr lang="en-US" dirty="0" smtClean="0">
+                <a:solidFill>
+                  <a:schemeClr val="tx2">
+                    <a:lumMod val="75000"/>
+                  </a:schemeClr>
+                </a:solidFill>
+              </a:rPr>
+              <a:t> </a:t>
+            </a:r>
+            <a:r>
+              <a:rPr lang="en-US" dirty="0">
+                <a:solidFill>
+                  <a:schemeClr val="tx2">
+                    <a:lumMod val="75000"/>
+                  </a:schemeClr>
+                </a:solidFill>
+              </a:rPr>
+              <a:t>Property("Category", "Regression</a:t>
+            </a:r>
+            <a:r>
+              <a:rPr lang="en-US" dirty="0" smtClean="0">
+                <a:solidFill>
+                  <a:schemeClr val="tx2">
+                    <a:lumMod val="75000"/>
+                  </a:schemeClr>
+                </a:solidFill>
+              </a:rPr>
+              <a:t>")(“normal”)</a:t>
+            </a:r>
+            <a:r>
+              <a:rPr lang="en-US" dirty="0" smtClean="0"/>
+              <a:t>)</a:t>
             </a:r>
             <a:endParaRPr lang="en-US" dirty="0"/>
           </a:p>
@@ -9122,7 +9195,15 @@
             </a:r>
             <a:r>
               <a:rPr lang="en-US" dirty="0"/>
-              <a:t>it to access the corresponding row in the </a:t>
+              <a:t>it to access the </a:t>
+            </a:r>
+            <a:r>
+              <a:rPr lang="en-US" dirty="0" smtClean="0"/>
+              <a:t>respective row </a:t>
+            </a:r>
+            <a:r>
+              <a:rPr lang="en-US" dirty="0"/>
+              <a:t>in the </a:t>
             </a:r>
             <a:r>
               <a:rPr lang="en-US" dirty="0" err="1"/>

</xml_diff>

<commit_message>
Mention  TestsRun-TeamCity.bat in the pptx
</commit_message>
<xml_diff>
--- a/Documentation/SoftUni-QA_Automation-BlogProject-Feijoa-Features.pptx
+++ b/Documentation/SoftUni-QA_Automation-BlogProject-Feijoa-Features.pptx
@@ -125,7 +125,7 @@
   </p:defaultTextStyle>
   <p:extLst>
     <p:ext uri="{EFAFB233-063F-42B5-8137-9DF3F51BA10A}">
-      <p15:sldGuideLst xmlns="" xmlns:p15="http://schemas.microsoft.com/office/powerpoint/2012/main">
+      <p15:sldGuideLst xmlns:p15="http://schemas.microsoft.com/office/powerpoint/2012/main" xmlns="">
         <p15:guide id="1" orient="horz" pos="2160" userDrawn="1">
           <p15:clr>
             <a:srgbClr val="A4A3A4"/>
@@ -139,7 +139,7 @@
       </p15:sldGuideLst>
     </p:ext>
     <p:ext uri="{2D200454-40CA-4A62-9FC3-DE9A4176ACB9}">
-      <p15:notesGuideLst xmlns="" xmlns:p15="http://schemas.microsoft.com/office/powerpoint/2012/main">
+      <p15:notesGuideLst xmlns:p15="http://schemas.microsoft.com/office/powerpoint/2012/main" xmlns="">
         <p15:guide id="1" orient="horz" pos="2880">
           <p15:clr>
             <a:srgbClr val="A4A3A4"/>
@@ -239,7 +239,7 @@
             <a:fld id="{FE5B4EDC-59C0-49C7-8ADA-5A781B329E02}" type="datetimeFigureOut">
               <a:rPr lang="en-US"/>
               <a:pPr/>
-              <a:t>07-Jun-17</a:t>
+              <a:t>08-Jun-17</a:t>
             </a:fld>
             <a:endParaRPr dirty="0"/>
           </a:p>
@@ -438,7 +438,7 @@
             <a:fld id="{F2D8D46A-B586-417D-BFBD-8C8FE0AAF762}" type="datetimeFigureOut">
               <a:rPr lang="en-US" smtClean="0"/>
               <a:pPr/>
-              <a:t>07-Jun-17</a:t>
+              <a:t>08-Jun-17</a:t>
             </a:fld>
             <a:endParaRPr lang="en-US"/>
           </a:p>
@@ -3242,7 +3242,7 @@
             <a:fld id="{055373AC-9AA7-423B-BA00-BA1C74164DBD}" type="datetime1">
               <a:rPr lang="en-US" smtClean="0"/>
               <a:pPr/>
-              <a:t>07-Jun-17</a:t>
+              <a:t>08-Jun-17</a:t>
             </a:fld>
             <a:endParaRPr lang="en-US" dirty="0"/>
           </a:p>
@@ -4513,7 +4513,7 @@
             <a:fld id="{055373AC-9AA7-423B-BA00-BA1C74164DBD}" type="datetime1">
               <a:rPr lang="en-US" smtClean="0"/>
               <a:pPr/>
-              <a:t>07-Jun-17</a:t>
+              <a:t>08-Jun-17</a:t>
             </a:fld>
             <a:endParaRPr lang="en-US" dirty="0"/>
           </a:p>
@@ -5057,7 +5057,7 @@
   </p:txStyles>
   <p:extLst mod="1">
     <p:ext uri="{27BBF7A9-308A-43DC-89C8-2F10F3537804}">
-      <p15:sldGuideLst xmlns="" xmlns:p15="http://schemas.microsoft.com/office/powerpoint/2012/main">
+      <p15:sldGuideLst xmlns:p15="http://schemas.microsoft.com/office/powerpoint/2012/main" xmlns="">
         <p15:guide id="1" orient="horz" pos="2160" userDrawn="1">
           <p15:clr>
             <a:srgbClr val="F26B43"/>
@@ -5830,16 +5830,16 @@
           <a:p>
             <a:pPr algn="r"/>
             <a:r>
-              <a:rPr lang="en-US" b="0" dirty="0"/>
+              <a:rPr lang="en-US" b="0"/>
               <a:t>v</a:t>
             </a:r>
             <a:r>
-              <a:rPr lang="en-US" b="0" dirty="0" smtClean="0"/>
+              <a:rPr lang="en-US" b="0" smtClean="0"/>
               <a:t> </a:t>
             </a:r>
             <a:r>
-              <a:rPr lang="en-US" b="0" dirty="0" smtClean="0"/>
-              <a:t>2.2</a:t>
+              <a:rPr lang="en-US" b="0" smtClean="0"/>
+              <a:t>2.3</a:t>
             </a:r>
             <a:endParaRPr lang="en-US" b="0" dirty="0"/>
           </a:p>
@@ -9359,47 +9359,6 @@
           <a:chExt cx="0" cy="0"/>
         </a:xfrm>
       </p:grpSpPr>
-      <p:pic>
-        <p:nvPicPr>
-          <p:cNvPr id="1027" name="Picture 3" descr="C:\Users\vaneto\Documents\Visual Studio 2015\Projects\Blog-Skeleton\Blog-Skeleton\misc\test_header.JPG"/>
-          <p:cNvPicPr>
-            <a:picLocks noChangeAspect="1" noChangeArrowheads="1"/>
-          </p:cNvPicPr>
-          <p:nvPr/>
-        </p:nvPicPr>
-        <p:blipFill>
-          <a:blip r:embed="rId3">
-            <a:extLst>
-              <a:ext uri="{28A0092B-C50C-407E-A947-70E740481C1C}">
-                <a14:useLocalDpi xmlns:a14="http://schemas.microsoft.com/office/drawing/2010/main"/>
-              </a:ext>
-            </a:extLst>
-          </a:blip>
-          <a:srcRect/>
-          <a:stretch>
-            <a:fillRect/>
-          </a:stretch>
-        </p:blipFill>
-        <p:spPr bwMode="auto">
-          <a:xfrm>
-            <a:off x="1293812" y="5619382"/>
-            <a:ext cx="10471150" cy="1187450"/>
-          </a:xfrm>
-          <a:prstGeom prst="rect">
-            <a:avLst/>
-          </a:prstGeom>
-          <a:noFill/>
-          <a:extLst>
-            <a:ext uri="{909E8E84-426E-40DD-AFC4-6F175D3DCCD1}">
-              <a14:hiddenFill xmlns:a14="http://schemas.microsoft.com/office/drawing/2010/main">
-                <a:solidFill>
-                  <a:srgbClr val="FFFFFF"/>
-                </a:solidFill>
-              </a14:hiddenFill>
-            </a:ext>
-          </a:extLst>
-        </p:spPr>
-      </p:pic>
       <p:sp>
         <p:nvSpPr>
           <p:cNvPr id="4" name="Slide Number Placeholder 3"/>
@@ -9658,8 +9617,18 @@
               <a:t>\bin\Debug\Blog.UI.Tests.dll</a:t>
             </a:r>
             <a:r>
-              <a:rPr lang="en-US" sz="2600" dirty="0" smtClean="0"/>
-              <a:t>)</a:t>
+              <a:rPr lang="en-US" sz="2600" dirty="0"/>
+              <a:t>) – see </a:t>
+            </a:r>
+            <a:r>
+              <a:rPr lang="en-US" sz="2600" dirty="0" smtClean="0">
+                <a:solidFill>
+                  <a:schemeClr val="tx2">
+                    <a:lumMod val="75000"/>
+                  </a:schemeClr>
+                </a:solidFill>
+              </a:rPr>
+              <a:t>TestsRun.bat</a:t>
             </a:r>
             <a:endParaRPr lang="en-US" sz="2600" dirty="0"/>
           </a:p>
@@ -9813,7 +9782,7 @@
             </a:r>
             <a:r>
               <a:rPr lang="en-US" sz="2600" dirty="0"/>
-              <a:t>run from command line according to criteria, e.g</a:t>
+              <a:t>run from command line according to criteria, e.g.: </a:t>
             </a:r>
             <a:r>
               <a:rPr lang="en-US" sz="2600" dirty="0">
@@ -9823,41 +9792,21 @@
                   </a:schemeClr>
                 </a:solidFill>
               </a:rPr>
-              <a:t>.: --where "method == </a:t>
-            </a:r>
-            <a:r>
-              <a:rPr lang="en-US" sz="2600" dirty="0" err="1">
+              <a:t>--where "Category == Regression“</a:t>
+            </a:r>
+            <a:r>
+              <a:rPr lang="en-US" sz="2600" dirty="0"/>
+              <a:t> – see </a:t>
+            </a:r>
+            <a:r>
+              <a:rPr lang="en-US" sz="2600" dirty="0" smtClean="0">
                 <a:solidFill>
                   <a:schemeClr val="tx2">
                     <a:lumMod val="75000"/>
                   </a:schemeClr>
                 </a:solidFill>
               </a:rPr>
-              <a:t>FirstNameField_Empty_ErrorMessage</a:t>
-            </a:r>
-            <a:r>
-              <a:rPr lang="en-US" sz="2600" dirty="0"/>
-              <a:t>" or </a:t>
-            </a:r>
-            <a:r>
-              <a:rPr lang="en-US" sz="2600" dirty="0">
-                <a:solidFill>
-                  <a:schemeClr val="tx2">
-                    <a:lumMod val="75000"/>
-                  </a:schemeClr>
-                </a:solidFill>
-              </a:rPr>
-              <a:t>--where "cat == Urgent || Priority == High</a:t>
-            </a:r>
-            <a:r>
-              <a:rPr lang="en-US" sz="2600" dirty="0" smtClean="0">
-                <a:solidFill>
-                  <a:schemeClr val="tx2">
-                    <a:lumMod val="75000"/>
-                  </a:schemeClr>
-                </a:solidFill>
-              </a:rPr>
-              <a:t>“</a:t>
+              <a:t>TestsRun-TeamCity.bat</a:t>
             </a:r>
             <a:endParaRPr lang="en-US" sz="2600" dirty="0">
               <a:solidFill>
@@ -9869,6 +9818,60 @@
           </a:p>
         </p:txBody>
       </p:sp>
+      <p:pic>
+        <p:nvPicPr>
+          <p:cNvPr id="1026" name="Picture 2"/>
+          <p:cNvPicPr>
+            <a:picLocks noChangeAspect="1" noChangeArrowheads="1"/>
+          </p:cNvPicPr>
+          <p:nvPr/>
+        </p:nvPicPr>
+        <p:blipFill>
+          <a:blip r:embed="rId3">
+            <a:extLst>
+              <a:ext uri="{28A0092B-C50C-407E-A947-70E740481C1C}">
+                <a14:useLocalDpi xmlns:a14="http://schemas.microsoft.com/office/drawing/2010/main" val="0"/>
+              </a:ext>
+            </a:extLst>
+          </a:blip>
+          <a:srcRect/>
+          <a:stretch>
+            <a:fillRect/>
+          </a:stretch>
+        </p:blipFill>
+        <p:spPr bwMode="auto">
+          <a:xfrm>
+            <a:off x="1598612" y="5715000"/>
+            <a:ext cx="9340850" cy="1009650"/>
+          </a:xfrm>
+          <a:prstGeom prst="rect">
+            <a:avLst/>
+          </a:prstGeom>
+          <a:noFill/>
+          <a:ln>
+            <a:noFill/>
+          </a:ln>
+          <a:extLst>
+            <a:ext uri="{909E8E84-426E-40DD-AFC4-6F175D3DCCD1}">
+              <a14:hiddenFill xmlns:a14="http://schemas.microsoft.com/office/drawing/2010/main">
+                <a:solidFill>
+                  <a:schemeClr val="accent1"/>
+                </a:solidFill>
+              </a14:hiddenFill>
+            </a:ext>
+            <a:ext uri="{91240B29-F687-4F45-9708-019B960494DF}">
+              <a14:hiddenLine xmlns:a14="http://schemas.microsoft.com/office/drawing/2010/main" w="9525">
+                <a:solidFill>
+                  <a:schemeClr val="tx1"/>
+                </a:solidFill>
+                <a:miter lim="800000"/>
+                <a:headEnd/>
+                <a:tailEnd/>
+              </a14:hiddenLine>
+            </a:ext>
+          </a:extLst>
+        </p:spPr>
+      </p:pic>
     </p:spTree>
     <p:extLst>
       <p:ext uri="{BB962C8B-B14F-4D97-AF65-F5344CB8AC3E}">

</xml_diff>

<commit_message>
plant RANDOM function in the xlsx file not so much effect from it anyway.
</commit_message>
<xml_diff>
--- a/Documentation/SoftUni-QA_Automation-BlogProject-Feijoa-Features.pptx
+++ b/Documentation/SoftUni-QA_Automation-BlogProject-Feijoa-Features.pptx
@@ -125,7 +125,7 @@
   </p:defaultTextStyle>
   <p:extLst>
     <p:ext uri="{EFAFB233-063F-42B5-8137-9DF3F51BA10A}">
-      <p15:sldGuideLst xmlns:p15="http://schemas.microsoft.com/office/powerpoint/2012/main" xmlns="">
+      <p15:sldGuideLst xmlns="" xmlns:p15="http://schemas.microsoft.com/office/powerpoint/2012/main">
         <p15:guide id="1" orient="horz" pos="2160" userDrawn="1">
           <p15:clr>
             <a:srgbClr val="A4A3A4"/>
@@ -139,7 +139,7 @@
       </p15:sldGuideLst>
     </p:ext>
     <p:ext uri="{2D200454-40CA-4A62-9FC3-DE9A4176ACB9}">
-      <p15:notesGuideLst xmlns:p15="http://schemas.microsoft.com/office/powerpoint/2012/main" xmlns="">
+      <p15:notesGuideLst xmlns="" xmlns:p15="http://schemas.microsoft.com/office/powerpoint/2012/main">
         <p15:guide id="1" orient="horz" pos="2880">
           <p15:clr>
             <a:srgbClr val="A4A3A4"/>
@@ -5057,7 +5057,7 @@
   </p:txStyles>
   <p:extLst mod="1">
     <p:ext uri="{27BBF7A9-308A-43DC-89C8-2F10F3537804}">
-      <p15:sldGuideLst xmlns:p15="http://schemas.microsoft.com/office/powerpoint/2012/main" xmlns="">
+      <p15:sldGuideLst xmlns="" xmlns:p15="http://schemas.microsoft.com/office/powerpoint/2012/main">
         <p15:guide id="1" orient="horz" pos="2160" userDrawn="1">
           <p15:clr>
             <a:srgbClr val="F26B43"/>
@@ -5835,11 +5835,7 @@
             </a:r>
             <a:r>
               <a:rPr lang="en-US" b="0" smtClean="0"/>
-              <a:t> </a:t>
-            </a:r>
-            <a:r>
-              <a:rPr lang="en-US" b="0" smtClean="0"/>
-              <a:t>2.3</a:t>
+              <a:t> 2.3</a:t>
             </a:r>
             <a:endParaRPr lang="en-US" b="0" dirty="0"/>
           </a:p>
@@ -9830,7 +9826,7 @@
           <a:blip r:embed="rId3">
             <a:extLst>
               <a:ext uri="{28A0092B-C50C-407E-A947-70E740481C1C}">
-                <a14:useLocalDpi xmlns:a14="http://schemas.microsoft.com/office/drawing/2010/main" val="0"/>
+                <a14:useLocalDpi xmlns:a14="http://schemas.microsoft.com/office/drawing/2010/main"/>
               </a:ext>
             </a:extLst>
           </a:blip>

</xml_diff>

<commit_message>
Minor improvements mainly in Documentation
</commit_message>
<xml_diff>
--- a/Documentation/SoftUni-QA_Automation-BlogProject-Feijoa-Features.pptx
+++ b/Documentation/SoftUni-QA_Automation-BlogProject-Feijoa-Features.pptx
@@ -125,7 +125,7 @@
   </p:defaultTextStyle>
   <p:extLst>
     <p:ext uri="{EFAFB233-063F-42B5-8137-9DF3F51BA10A}">
-      <p15:sldGuideLst xmlns="" xmlns:p15="http://schemas.microsoft.com/office/powerpoint/2012/main">
+      <p15:sldGuideLst xmlns:p15="http://schemas.microsoft.com/office/powerpoint/2012/main" xmlns="">
         <p15:guide id="1" orient="horz" pos="2160" userDrawn="1">
           <p15:clr>
             <a:srgbClr val="A4A3A4"/>
@@ -139,7 +139,7 @@
       </p15:sldGuideLst>
     </p:ext>
     <p:ext uri="{2D200454-40CA-4A62-9FC3-DE9A4176ACB9}">
-      <p15:notesGuideLst xmlns="" xmlns:p15="http://schemas.microsoft.com/office/powerpoint/2012/main">
+      <p15:notesGuideLst xmlns:p15="http://schemas.microsoft.com/office/powerpoint/2012/main" xmlns="">
         <p15:guide id="1" orient="horz" pos="2880">
           <p15:clr>
             <a:srgbClr val="A4A3A4"/>
@@ -239,7 +239,7 @@
             <a:fld id="{FE5B4EDC-59C0-49C7-8ADA-5A781B329E02}" type="datetimeFigureOut">
               <a:rPr lang="en-US"/>
               <a:pPr/>
-              <a:t>08-Jun-17</a:t>
+              <a:t>29-Jun-17</a:t>
             </a:fld>
             <a:endParaRPr dirty="0"/>
           </a:p>
@@ -438,7 +438,7 @@
             <a:fld id="{F2D8D46A-B586-417D-BFBD-8C8FE0AAF762}" type="datetimeFigureOut">
               <a:rPr lang="en-US" smtClean="0"/>
               <a:pPr/>
-              <a:t>08-Jun-17</a:t>
+              <a:t>29-Jun-17</a:t>
             </a:fld>
             <a:endParaRPr lang="en-US"/>
           </a:p>
@@ -3242,7 +3242,7 @@
             <a:fld id="{055373AC-9AA7-423B-BA00-BA1C74164DBD}" type="datetime1">
               <a:rPr lang="en-US" smtClean="0"/>
               <a:pPr/>
-              <a:t>08-Jun-17</a:t>
+              <a:t>29-Jun-17</a:t>
             </a:fld>
             <a:endParaRPr lang="en-US" dirty="0"/>
           </a:p>
@@ -4513,7 +4513,7 @@
             <a:fld id="{055373AC-9AA7-423B-BA00-BA1C74164DBD}" type="datetime1">
               <a:rPr lang="en-US" smtClean="0"/>
               <a:pPr/>
-              <a:t>08-Jun-17</a:t>
+              <a:t>29-Jun-17</a:t>
             </a:fld>
             <a:endParaRPr lang="en-US" dirty="0"/>
           </a:p>
@@ -5057,7 +5057,7 @@
   </p:txStyles>
   <p:extLst mod="1">
     <p:ext uri="{27BBF7A9-308A-43DC-89C8-2F10F3537804}">
-      <p15:sldGuideLst xmlns="" xmlns:p15="http://schemas.microsoft.com/office/powerpoint/2012/main">
+      <p15:sldGuideLst xmlns:p15="http://schemas.microsoft.com/office/powerpoint/2012/main" xmlns="">
         <p15:guide id="1" orient="horz" pos="2160" userDrawn="1">
           <p15:clr>
             <a:srgbClr val="F26B43"/>
@@ -5137,7 +5137,7 @@
         </p:spPr>
         <p:txBody>
           <a:bodyPr>
-            <a:normAutofit/>
+            <a:normAutofit lnSpcReduction="10000"/>
           </a:bodyPr>
           <a:lstStyle/>
           <a:p>
@@ -5149,9 +5149,12 @@
               <a:rPr lang="en-US" dirty="0" err="1" smtClean="0"/>
               <a:t>Feijoa</a:t>
             </a:r>
-            <a:r>
-              <a:rPr lang="en-US" dirty="0" smtClean="0"/>
-              <a:t> 2017</a:t>
+            <a:endParaRPr lang="en-US" dirty="0"/>
+          </a:p>
+          <a:p>
+            <a:r>
+              <a:rPr lang="en-US" dirty="0" smtClean="0"/>
+              <a:t>Spring 2017</a:t>
             </a:r>
             <a:endParaRPr lang="en-US" dirty="0"/>
           </a:p>
@@ -5830,12 +5833,16 @@
           <a:p>
             <a:pPr algn="r"/>
             <a:r>
-              <a:rPr lang="en-US" b="0"/>
+              <a:rPr lang="en-US" b="0" dirty="0"/>
               <a:t>v</a:t>
             </a:r>
             <a:r>
-              <a:rPr lang="en-US" b="0" smtClean="0"/>
-              <a:t> 2.3</a:t>
+              <a:rPr lang="en-US" b="0" dirty="0" smtClean="0"/>
+              <a:t> </a:t>
+            </a:r>
+            <a:r>
+              <a:rPr lang="en-US" b="0" dirty="0" smtClean="0"/>
+              <a:t>2.3.1</a:t>
             </a:r>
             <a:endParaRPr lang="en-US" b="0" dirty="0"/>
           </a:p>
@@ -5937,7 +5944,7 @@
         </p:spPr>
         <p:txBody>
           <a:bodyPr>
-            <a:normAutofit lnSpcReduction="10000"/>
+            <a:normAutofit fontScale="92500" lnSpcReduction="10000"/>
           </a:bodyPr>
           <a:lstStyle/>
           <a:p>
@@ -5947,8 +5954,12 @@
               </a:lnSpc>
             </a:pPr>
             <a:r>
+              <a:rPr lang="en-US" dirty="0" smtClean="0"/>
+              <a:t>Team City sends </a:t>
+            </a:r>
+            <a:r>
               <a:rPr lang="en-US" dirty="0"/>
-              <a:t>Sends build/tests results emails to </a:t>
+              <a:t>build/tests results emails to </a:t>
             </a:r>
             <a:r>
               <a:rPr lang="en-US" dirty="0" smtClean="0">
@@ -5977,12 +5988,9 @@
             </a:br>
             <a:r>
               <a:rPr lang="en-US" dirty="0" smtClean="0"/>
-              <a:t>implemented</a:t>
-            </a:r>
-            <a:r>
-              <a:rPr lang="en-US" dirty="0"/>
-              <a:t>:</a:t>
-            </a:r>
+              <a:t>implemented in-code:</a:t>
+            </a:r>
+            <a:endParaRPr lang="en-US" dirty="0"/>
           </a:p>
           <a:p>
             <a:pPr lvl="1">
@@ -5991,8 +5999,12 @@
               </a:lnSpc>
             </a:pPr>
             <a:r>
+              <a:rPr lang="en-US" dirty="0" smtClean="0"/>
+              <a:t>\\TestResult.txt </a:t>
+            </a:r>
+            <a:r>
               <a:rPr lang="en-US" dirty="0"/>
-              <a:t>TestResult.txt – single info </a:t>
+              <a:t>– single info </a:t>
             </a:r>
             <a:r>
               <a:rPr lang="en-US" dirty="0" smtClean="0"/>
@@ -6017,23 +6029,31 @@
               </a:lnSpc>
             </a:pPr>
             <a:r>
+              <a:rPr lang="en-US" dirty="0" smtClean="0"/>
+              <a:t>\\Logs\Log.txt</a:t>
+            </a:r>
+            <a:r>
+              <a:rPr lang="en-US" dirty="0" smtClean="0"/>
+              <a:t/>
+            </a:r>
+            <a:br>
+              <a:rPr lang="en-US" dirty="0" smtClean="0"/>
+            </a:br>
+            <a:r>
+              <a:rPr lang="en-US" dirty="0" smtClean="0"/>
+              <a:t> </a:t>
+            </a:r>
+            <a:r>
               <a:rPr lang="en-US" dirty="0"/>
-              <a:t>Log.txt (in \\Logs </a:t>
-            </a:r>
-            <a:r>
-              <a:rPr lang="en-US" dirty="0" smtClean="0"/>
-              <a:t>directory)</a:t>
-            </a:r>
-            <a:br>
-              <a:rPr lang="en-US" dirty="0" smtClean="0"/>
-            </a:br>
-            <a:r>
-              <a:rPr lang="en-US" dirty="0" smtClean="0"/>
-              <a:t> </a:t>
+              <a:t>– </a:t>
+            </a:r>
+            <a:r>
+              <a:rPr lang="en-US" dirty="0" smtClean="0"/>
+              <a:t>a single </a:t>
             </a:r>
             <a:r>
               <a:rPr lang="en-US" dirty="0"/>
-              <a:t>– single file for all tests </a:t>
+              <a:t>file for all tests </a:t>
             </a:r>
             <a:r>
               <a:rPr lang="en-US" dirty="0" smtClean="0"/>
@@ -6059,37 +6079,61 @@
             </a:pPr>
             <a:r>
               <a:rPr lang="en-US" dirty="0" smtClean="0"/>
+              <a:t>\\Log\ *.</a:t>
+            </a:r>
+            <a:r>
+              <a:rPr lang="en-US" dirty="0"/>
+              <a:t>txt </a:t>
+            </a:r>
+            <a:r>
+              <a:rPr lang="en-US" dirty="0" smtClean="0"/>
+              <a:t>report file and </a:t>
+            </a:r>
+            <a:br>
+              <a:rPr lang="en-US" dirty="0" smtClean="0"/>
+            </a:br>
+            <a:r>
+              <a:rPr lang="en-US" dirty="0" smtClean="0"/>
               <a:t>*.</a:t>
             </a:r>
             <a:r>
               <a:rPr lang="en-US" dirty="0"/>
-              <a:t>txt and </a:t>
-            </a:r>
-            <a:r>
-              <a:rPr lang="en-US" dirty="0" smtClean="0"/>
-              <a:t>*.</a:t>
+              <a:t>jpg </a:t>
+            </a:r>
+            <a:r>
+              <a:rPr lang="en-US" dirty="0" smtClean="0"/>
+              <a:t>screenshot </a:t>
             </a:r>
             <a:r>
               <a:rPr lang="en-US" dirty="0"/>
-              <a:t>jpg file for every </a:t>
-            </a:r>
-            <a:r>
-              <a:rPr lang="en-US" dirty="0" smtClean="0"/>
-              <a:t/>
-            </a:r>
-            <a:br>
-              <a:rPr lang="en-US" dirty="0" smtClean="0"/>
-            </a:br>
+              <a:t>for every </a:t>
+            </a:r>
             <a:r>
               <a:rPr lang="en-US" dirty="0" smtClean="0"/>
               <a:t>failed </a:t>
             </a:r>
             <a:r>
               <a:rPr lang="en-US" dirty="0"/>
-              <a:t>test (see the [</a:t>
-            </a:r>
-            <a:r>
-              <a:rPr lang="en-US" dirty="0" err="1"/>
+              <a:t>test (see the </a:t>
+            </a:r>
+            <a:r>
+              <a:rPr lang="en-US" dirty="0" err="1" smtClean="0"/>
+              <a:t>YeOldeFailedTestsLogger</a:t>
+            </a:r>
+            <a:r>
+              <a:rPr lang="en-US" dirty="0" smtClean="0"/>
+              <a:t> in </a:t>
+            </a:r>
+            <a:r>
+              <a:rPr lang="en-US" dirty="0" err="1" smtClean="0"/>
+              <a:t>BasePage.cs</a:t>
+            </a:r>
+            <a:r>
+              <a:rPr lang="en-US" dirty="0" smtClean="0"/>
+              <a:t> called from [</a:t>
+            </a:r>
+            <a:r>
+              <a:rPr lang="en-US" dirty="0" err="1" smtClean="0"/>
               <a:t>TearDown</a:t>
             </a:r>
             <a:r>
@@ -6097,20 +6141,13 @@
               <a:t>] section of every *</a:t>
             </a:r>
             <a:r>
-              <a:rPr lang="en-US" dirty="0" err="1"/>
+              <a:rPr lang="en-US" dirty="0" err="1" smtClean="0"/>
               <a:t>Tests.cs</a:t>
             </a:r>
             <a:r>
-              <a:rPr lang="en-US" dirty="0"/>
-              <a:t> file - in \\Log directory)</a:t>
-            </a:r>
-          </a:p>
-          <a:p>
-            <a:pPr>
-              <a:lnSpc>
-                <a:spcPct val="100000"/>
-              </a:lnSpc>
-            </a:pPr>
+              <a:rPr lang="en-US" dirty="0" smtClean="0"/>
+              <a:t>)</a:t>
+            </a:r>
             <a:endParaRPr lang="en-US" dirty="0"/>
           </a:p>
           <a:p>
@@ -6180,7 +6217,7 @@
         <p:spPr bwMode="auto">
           <a:xfrm>
             <a:off x="5397035" y="1555619"/>
-            <a:ext cx="6488577" cy="4006981"/>
+            <a:ext cx="6365185" cy="3930781"/>
           </a:xfrm>
           <a:prstGeom prst="rect">
             <a:avLst/>
@@ -6334,7 +6371,15 @@
             </a:pPr>
             <a:r>
               <a:rPr lang="en-US" sz="3200" dirty="0" smtClean="0"/>
-              <a:t>A job well done!</a:t>
+              <a:t>A job </a:t>
+            </a:r>
+            <a:r>
+              <a:rPr lang="en-US" sz="3200" dirty="0" smtClean="0"/>
+              <a:t>passionately done</a:t>
+            </a:r>
+            <a:r>
+              <a:rPr lang="en-US" sz="3200" dirty="0" smtClean="0"/>
+              <a:t>!</a:t>
             </a:r>
           </a:p>
         </p:txBody>
@@ -8196,8 +8241,8 @@
         </p:nvSpPr>
         <p:spPr>
           <a:xfrm>
-            <a:off x="895607" y="2816754"/>
-            <a:ext cx="1332865" cy="523220"/>
+            <a:off x="280652" y="2829580"/>
+            <a:ext cx="6640279" cy="523220"/>
           </a:xfrm>
           <a:prstGeom prst="rect">
             <a:avLst/>
@@ -8239,7 +8284,38 @@
                 </a:effectLst>
                 <a:latin typeface="+mj-lt"/>
               </a:rPr>
-              <a:t>A team</a:t>
+              <a:t>A </a:t>
+            </a:r>
+            <a:r>
+              <a:rPr lang="en-US" sz="2800" b="1" spc="100" dirty="0" smtClean="0">
+                <a:ln w="18000">
+                  <a:solidFill>
+                    <a:schemeClr val="accent1">
+                      <a:satMod val="200000"/>
+                      <a:tint val="72000"/>
+                    </a:schemeClr>
+                  </a:solidFill>
+                  <a:prstDash val="solid"/>
+                </a:ln>
+                <a:solidFill>
+                  <a:schemeClr val="accent1">
+                    <a:satMod val="280000"/>
+                    <a:tint val="100000"/>
+                    <a:alpha val="5700"/>
+                  </a:schemeClr>
+                </a:solidFill>
+                <a:effectLst>
+                  <a:outerShdw blurRad="25000" dist="20000" dir="16020000" algn="tl">
+                    <a:schemeClr val="accent1">
+                      <a:satMod val="200000"/>
+                      <a:shade val="1000"/>
+                      <a:alpha val="60000"/>
+                    </a:schemeClr>
+                  </a:outerShdw>
+                </a:effectLst>
+                <a:latin typeface="+mj-lt"/>
+              </a:rPr>
+              <a:t>complete team to work on the project</a:t>
             </a:r>
             <a:endParaRPr lang="en-US" sz="2800" b="1" spc="100" dirty="0">
               <a:ln w="18000">
@@ -8368,7 +8444,7 @@
         </p:spPr>
         <p:txBody>
           <a:bodyPr>
-            <a:normAutofit fontScale="85000" lnSpcReduction="20000"/>
+            <a:normAutofit fontScale="77500" lnSpcReduction="20000"/>
           </a:bodyPr>
           <a:lstStyle/>
           <a:p>
@@ -8509,9 +8585,22 @@
               <a:t>SRS </a:t>
             </a:r>
             <a:r>
+              <a:rPr lang="en-US" dirty="0" smtClean="0"/>
+              <a:t>– contains requirements even </a:t>
+            </a:r>
+            <a:r>
               <a:rPr lang="en-US" dirty="0"/>
-              <a:t>- has tests even for the Comment Article functionality</a:t>
-            </a:r>
+              <a:t>for the Comment Article </a:t>
+            </a:r>
+            <a:r>
+              <a:rPr lang="en-US" dirty="0"/>
+              <a:t>– a functionality still not </a:t>
+            </a:r>
+            <a:r>
+              <a:rPr lang="en-US" dirty="0" smtClean="0"/>
+              <a:t>implemented</a:t>
+            </a:r>
+            <a:endParaRPr lang="en-US" dirty="0"/>
           </a:p>
           <a:p>
             <a:pPr lvl="1">
@@ -8540,8 +8629,25 @@
             </a:r>
             <a:r>
               <a:rPr lang="en-US" dirty="0"/>
-              <a:t>Scenarios and Test Cases</a:t>
-            </a:r>
+              <a:t>Scenarios and Test </a:t>
+            </a:r>
+            <a:r>
+              <a:rPr lang="en-US" dirty="0"/>
+              <a:t>Cases </a:t>
+            </a:r>
+            <a:r>
+              <a:rPr lang="en-US" dirty="0" smtClean="0"/>
+              <a:t>– contain tests </a:t>
+            </a:r>
+            <a:r>
+              <a:rPr lang="en-US" dirty="0"/>
+              <a:t>even for the Comment Article – a functionality still not </a:t>
+            </a:r>
+            <a:r>
+              <a:rPr lang="en-US" dirty="0" smtClean="0"/>
+              <a:t>implemented</a:t>
+            </a:r>
+            <a:endParaRPr lang="en-US" dirty="0"/>
           </a:p>
           <a:p>
             <a:pPr lvl="1">
@@ -8734,12 +8840,13 @@
             </a:r>
           </a:p>
           <a:p>
-            <a:pPr>
+            <a:pPr marL="0" indent="0">
               <a:lnSpc>
                 <a:spcPct val="100000"/>
               </a:lnSpc>
+              <a:buNone/>
             </a:pPr>
-            <a:endParaRPr lang="en-US" dirty="0"/>
+            <a:endParaRPr lang="en-US" dirty="0" smtClean="0"/>
           </a:p>
           <a:p>
             <a:pPr>
@@ -8755,29 +8862,29 @@
                 <a:spcPct val="100000"/>
               </a:lnSpc>
             </a:pPr>
-            <a:endParaRPr lang="en-US" dirty="0" smtClean="0"/>
-          </a:p>
-          <a:p>
-            <a:pPr>
-              <a:lnSpc>
-                <a:spcPct val="100000"/>
-              </a:lnSpc>
-            </a:pPr>
             <a:r>
               <a:rPr lang="en-US" dirty="0" err="1" smtClean="0"/>
               <a:t>Optimisation</a:t>
             </a:r>
             <a:r>
               <a:rPr lang="en-US" dirty="0" smtClean="0"/>
-              <a:t> by Gherkin </a:t>
+              <a:t> </a:t>
+            </a:r>
+            <a:r>
+              <a:rPr lang="en-US" dirty="0" smtClean="0"/>
+              <a:t>of the code by </a:t>
+            </a:r>
+            <a:r>
+              <a:rPr lang="en-US" dirty="0" smtClean="0"/>
+              <a:t>Gherkin </a:t>
             </a:r>
             <a:r>
               <a:rPr lang="en-US" dirty="0"/>
-              <a:t>tests in the </a:t>
-            </a:r>
-            <a:r>
-              <a:rPr lang="en-US" dirty="0" smtClean="0"/>
-              <a:t>code: </a:t>
+              <a:t>tests in </a:t>
+            </a:r>
+            <a:r>
+              <a:rPr lang="en-US" dirty="0" smtClean="0"/>
+              <a:t>it: </a:t>
             </a:r>
             <a:r>
               <a:rPr lang="en-US" dirty="0" smtClean="0">
@@ -8804,11 +8911,11 @@
               <a:t>in </a:t>
             </a:r>
             <a:r>
-              <a:rPr lang="en-US" dirty="0" smtClean="0"/>
+              <a:rPr lang="en-US" i="1" dirty="0" smtClean="0"/>
               <a:t>*.</a:t>
             </a:r>
             <a:r>
-              <a:rPr lang="en-US" dirty="0"/>
+              <a:rPr lang="en-US" i="1" dirty="0"/>
               <a:t>feature </a:t>
             </a:r>
             <a:r>
@@ -8834,14 +8941,14 @@
               <a:t>on </a:t>
             </a:r>
             <a:r>
-              <a:rPr lang="en-US" dirty="0">
+              <a:rPr lang="en-US" dirty="0" smtClean="0">
                 <a:solidFill>
                   <a:schemeClr val="tx2">
                     <a:lumMod val="75000"/>
                   </a:schemeClr>
                 </a:solidFill>
               </a:rPr>
-              <a:t>only one test </a:t>
+              <a:t>one and the same test </a:t>
             </a:r>
             <a:r>
               <a:rPr lang="en-US" dirty="0" smtClean="0">
@@ -8855,13 +8962,17 @@
             </a:r>
             <a:r>
               <a:rPr lang="en-US" dirty="0" smtClean="0"/>
-              <a:t>in *</a:t>
-            </a:r>
-            <a:r>
-              <a:rPr lang="en-US" dirty="0" err="1" smtClean="0"/>
+              <a:t>in </a:t>
+            </a:r>
+            <a:r>
+              <a:rPr lang="en-US" i="1" dirty="0" smtClean="0"/>
+              <a:t>*</a:t>
+            </a:r>
+            <a:r>
+              <a:rPr lang="en-US" i="1" dirty="0" err="1" smtClean="0"/>
               <a:t>Steps.cs</a:t>
             </a:r>
-            <a:endParaRPr lang="en-US" dirty="0" smtClean="0"/>
+            <a:endParaRPr lang="en-US" i="1" dirty="0" smtClean="0"/>
           </a:p>
         </p:txBody>
       </p:sp>
@@ -9014,7 +9125,7 @@
         </p:spPr>
         <p:txBody>
           <a:bodyPr>
-            <a:normAutofit lnSpcReduction="10000"/>
+            <a:normAutofit fontScale="92500"/>
           </a:bodyPr>
           <a:lstStyle/>
           <a:p>
@@ -9024,16 +9135,42 @@
               </a:lnSpc>
             </a:pPr>
             <a:r>
+              <a:rPr lang="en-US" dirty="0">
+                <a:solidFill>
+                  <a:schemeClr val="tx2">
+                    <a:lumMod val="75000"/>
+                  </a:schemeClr>
+                </a:solidFill>
+              </a:rPr>
+              <a:t>Automatic input </a:t>
+            </a:r>
+            <a:r>
+              <a:rPr lang="en-US" dirty="0" smtClean="0"/>
+              <a:t>in </a:t>
+            </a:r>
+            <a:r>
               <a:rPr lang="en-US" dirty="0"/>
-              <a:t>Automatically writes in the </a:t>
-            </a:r>
-            <a:r>
-              <a:rPr lang="en-US" dirty="0" err="1"/>
+              <a:t>the </a:t>
+            </a:r>
+            <a:r>
+              <a:rPr lang="en-US" dirty="0" smtClean="0"/>
+              <a:t>.</a:t>
+            </a:r>
+            <a:r>
+              <a:rPr lang="en-US" dirty="0" err="1" smtClean="0"/>
               <a:t>xlsx</a:t>
             </a:r>
             <a:r>
+              <a:rPr lang="en-US" dirty="0" smtClean="0"/>
+              <a:t> </a:t>
+            </a:r>
+            <a:r>
               <a:rPr lang="en-US" dirty="0"/>
-              <a:t> file the last result of every test and makes it green/red(screenshot)</a:t>
+              <a:t>file the last result of every test and makes it </a:t>
+            </a:r>
+            <a:r>
+              <a:rPr lang="en-US" dirty="0" smtClean="0"/>
+              <a:t>green/red</a:t>
             </a:r>
           </a:p>
           <a:p>
@@ -9043,42 +9180,48 @@
               </a:lnSpc>
             </a:pPr>
             <a:r>
-              <a:rPr lang="en-US" dirty="0"/>
+              <a:rPr lang="en-US" dirty="0" smtClean="0"/>
               <a:t>The Gherkin test uses the exact </a:t>
             </a:r>
-            <a:r>
-              <a:rPr lang="en-US" dirty="0" smtClean="0"/>
-              <a:t/>
-            </a:r>
             <a:br>
               <a:rPr lang="en-US" dirty="0" smtClean="0"/>
             </a:br>
             <a:r>
-              <a:rPr lang="en-US" dirty="0" smtClean="0"/>
-              <a:t>same </a:t>
-            </a:r>
-            <a:r>
-              <a:rPr lang="en-US" dirty="0"/>
-              <a:t>row in </a:t>
-            </a:r>
-            <a:r>
-              <a:rPr lang="en-US" dirty="0" err="1"/>
+              <a:rPr lang="en-US" dirty="0">
+                <a:solidFill>
+                  <a:schemeClr val="tx2">
+                    <a:lumMod val="75000"/>
+                  </a:schemeClr>
+                </a:solidFill>
+              </a:rPr>
+              <a:t>same data row </a:t>
+            </a:r>
+            <a:r>
+              <a:rPr lang="en-US" dirty="0" smtClean="0"/>
+              <a:t>in .</a:t>
+            </a:r>
+            <a:r>
+              <a:rPr lang="en-US" dirty="0" err="1" smtClean="0"/>
               <a:t>xlsx</a:t>
             </a:r>
             <a:r>
-              <a:rPr lang="en-US" dirty="0"/>
-              <a:t> as its "normal test" </a:t>
-            </a:r>
-            <a:r>
-              <a:rPr lang="en-US" dirty="0" smtClean="0"/>
-              <a:t/>
+              <a:rPr lang="en-US" dirty="0" smtClean="0"/>
+              <a:t> as its </a:t>
+            </a:r>
+            <a:r>
+              <a:rPr lang="en-US" dirty="0" smtClean="0"/>
+              <a:t>“</a:t>
+            </a:r>
+            <a:r>
+              <a:rPr lang="en-US" dirty="0" smtClean="0"/>
+              <a:t>normal”</a:t>
             </a:r>
             <a:br>
               <a:rPr lang="en-US" dirty="0" smtClean="0"/>
             </a:br>
             <a:r>
               <a:rPr lang="en-US" dirty="0" smtClean="0"/>
-              <a:t>counterpart;</a:t>
+              <a:t>test counterpart;</a:t>
             </a:r>
           </a:p>
           <a:p>
@@ -9089,7 +9232,11 @@
             </a:pPr>
             <a:r>
               <a:rPr lang="en-US" dirty="0" smtClean="0"/>
-              <a:t>also exact properties to run a test suite (e.g.: </a:t>
+              <a:t>also matching properties </a:t>
+            </a:r>
+            <a:r>
+              <a:rPr lang="en-US" dirty="0" smtClean="0"/>
+              <a:t>to run a test suite (e.g.: </a:t>
             </a:r>
             <a:r>
               <a:rPr lang="en-US" dirty="0">
@@ -9109,11 +9256,11 @@
                   </a:schemeClr>
                 </a:solidFill>
               </a:rPr>
-              <a:t>Regression (Gherkin) </a:t>
-            </a:r>
-            <a:r>
-              <a:rPr lang="en-US" dirty="0" smtClean="0"/>
-              <a:t>vs</a:t>
+              <a:t>Regression (</a:t>
+            </a:r>
+            <a:r>
+              <a:rPr lang="en-US" dirty="0" smtClean="0"/>
+              <a:t>Gherkin</a:t>
             </a:r>
             <a:r>
               <a:rPr lang="en-US" dirty="0" smtClean="0">
@@ -9123,27 +9270,59 @@
                   </a:schemeClr>
                 </a:solidFill>
               </a:rPr>
-              <a:t> </a:t>
-            </a:r>
-            <a:r>
-              <a:rPr lang="en-US" dirty="0">
+              <a:t>) </a:t>
+            </a:r>
+            <a:r>
+              <a:rPr lang="en-US" dirty="0" smtClean="0"/>
+              <a:t>matches</a:t>
+            </a:r>
+            <a:r>
+              <a:rPr lang="en-US" dirty="0" smtClean="0">
                 <a:solidFill>
                   <a:schemeClr val="tx2">
                     <a:lumMod val="75000"/>
                   </a:schemeClr>
                 </a:solidFill>
               </a:rPr>
-              <a:t>Property("Category", "Regression</a:t>
-            </a:r>
-            <a:r>
-              <a:rPr lang="en-US" dirty="0" smtClean="0">
+              <a:t> </a:t>
+            </a:r>
+            <a:r>
+              <a:rPr lang="en-US" dirty="0">
                 <a:solidFill>
                   <a:schemeClr val="tx2">
                     <a:lumMod val="75000"/>
                   </a:schemeClr>
                 </a:solidFill>
               </a:rPr>
-              <a:t>")(“normal”)</a:t>
+              <a:t>Property("Category", "Regression</a:t>
+            </a:r>
+            <a:r>
+              <a:rPr lang="en-US" dirty="0" smtClean="0">
+                <a:solidFill>
+                  <a:schemeClr val="tx2">
+                    <a:lumMod val="75000"/>
+                  </a:schemeClr>
+                </a:solidFill>
+              </a:rPr>
+              <a:t>")(</a:t>
+            </a:r>
+            <a:r>
+              <a:rPr lang="en-US" dirty="0" smtClean="0"/>
+              <a:t>“</a:t>
+            </a:r>
+            <a:r>
+              <a:rPr lang="en-US" dirty="0" smtClean="0"/>
+              <a:t>normal” test</a:t>
+            </a:r>
+            <a:r>
+              <a:rPr lang="en-US" dirty="0" smtClean="0">
+                <a:solidFill>
+                  <a:schemeClr val="tx2">
+                    <a:lumMod val="75000"/>
+                  </a:schemeClr>
+                </a:solidFill>
+              </a:rPr>
+              <a:t>)</a:t>
             </a:r>
             <a:r>
               <a:rPr lang="en-US" dirty="0" smtClean="0"/>
@@ -9158,31 +9337,51 @@
               </a:lnSpc>
             </a:pPr>
             <a:r>
-              <a:rPr lang="en-US" dirty="0"/>
-              <a:t>Automated get of the </a:t>
-            </a:r>
-            <a:r>
-              <a:rPr lang="en-US" dirty="0">
+              <a:rPr lang="en-US" dirty="0" smtClean="0">
                 <a:solidFill>
                   <a:schemeClr val="tx2">
                     <a:lumMod val="75000"/>
                   </a:schemeClr>
                 </a:solidFill>
               </a:rPr>
-              <a:t>test method </a:t>
-            </a:r>
-            <a:r>
-              <a:rPr lang="en-US" dirty="0"/>
-              <a:t>name and </a:t>
-            </a:r>
-            <a:r>
-              <a:rPr lang="en-US" dirty="0" smtClean="0">
+              <a:t>Automatic </a:t>
+            </a:r>
+            <a:r>
+              <a:rPr lang="en-US" dirty="0">
                 <a:solidFill>
                   <a:schemeClr val="tx2">
                     <a:lumMod val="75000"/>
                   </a:schemeClr>
                 </a:solidFill>
               </a:rPr>
+              <a:t>get </a:t>
+            </a:r>
+            <a:r>
+              <a:rPr lang="en-US" dirty="0"/>
+              <a:t>of the </a:t>
+            </a:r>
+            <a:r>
+              <a:rPr lang="en-US" dirty="0">
+                <a:solidFill>
+                  <a:schemeClr val="tx2">
+                    <a:lumMod val="75000"/>
+                  </a:schemeClr>
+                </a:solidFill>
+              </a:rPr>
+              <a:t>test method </a:t>
+            </a:r>
+            <a:r>
+              <a:rPr lang="en-US" dirty="0"/>
+              <a:t>name and </a:t>
+            </a:r>
+            <a:r>
+              <a:rPr lang="en-US" dirty="0" smtClean="0">
+                <a:solidFill>
+                  <a:schemeClr val="tx2">
+                    <a:lumMod val="75000"/>
+                  </a:schemeClr>
+                </a:solidFill>
+              </a:rPr>
               <a:t>test result </a:t>
             </a:r>
             <a:r>
@@ -9202,12 +9401,20 @@
               <a:t>in the </a:t>
             </a:r>
             <a:r>
-              <a:rPr lang="en-US" dirty="0" err="1"/>
+              <a:rPr lang="en-US" dirty="0" smtClean="0"/>
+              <a:t>.</a:t>
+            </a:r>
+            <a:r>
+              <a:rPr lang="en-US" dirty="0" err="1" smtClean="0"/>
               <a:t>xlsx</a:t>
             </a:r>
             <a:r>
+              <a:rPr lang="en-US" dirty="0" smtClean="0"/>
+              <a:t> </a:t>
+            </a:r>
+            <a:r>
               <a:rPr lang="en-US" dirty="0"/>
-              <a:t> file (</a:t>
+              <a:t>file (</a:t>
             </a:r>
             <a:r>
               <a:rPr lang="en-US" dirty="0" smtClean="0"/>
@@ -9624,7 +9831,7 @@
                   </a:schemeClr>
                 </a:solidFill>
               </a:rPr>
-              <a:t>TestsRun.bat</a:t>
+              <a:t>\\TestsRun.bat</a:t>
             </a:r>
             <a:endParaRPr lang="en-US" sz="2600" dirty="0"/>
           </a:p>
@@ -9802,7 +10009,7 @@
                   </a:schemeClr>
                 </a:solidFill>
               </a:rPr>
-              <a:t>TestsRun-TeamCity.bat</a:t>
+              <a:t>\\TestsRun-TeamCity.bat</a:t>
             </a:r>
             <a:endParaRPr lang="en-US" sz="2600" dirty="0">
               <a:solidFill>
@@ -10007,7 +10214,7 @@
             </a:r>
             <a:r>
               <a:rPr lang="en-US" dirty="0" smtClean="0"/>
-              <a:t>time</a:t>
+              <a:t>test</a:t>
             </a:r>
             <a:endParaRPr lang="en-US" dirty="0"/>
           </a:p>

</xml_diff>